<commit_message>
edit search based notebook
</commit_message>
<xml_diff>
--- a/Slides/T3 - Path Planning.pptx
+++ b/Slides/T3 - Path Planning.pptx
@@ -11594,81 +11594,81 @@
 </file>
 
 <file path=customXml/item1.xml><?xml version="1.0" encoding="utf-8"?>
+<TemplafySlideTemplateConfiguration><![CDATA[{"documentContentValidatorConfiguration":{"enableDocumentContentValidator":false,"documentContentValidatorVersion":0},"elementsMetadata":[],"slideId":"636957681585124447","enableDocumentContentUpdater":true,"version":"1.2"}]]></TemplafySlideTemplateConfiguration>
+</file>
+
+<file path=customXml/item2.xml><?xml version="1.0" encoding="utf-8"?>
 <TemplafySlideFormConfiguration><![CDATA[{"formFields":[],"formDataEntries":[]}]]></TemplafySlideFormConfiguration>
 </file>
 
-<file path=customXml/item2.xml><?xml version="1.0" encoding="utf-8"?>
+<file path=customXml/item3.xml><?xml version="1.0" encoding="utf-8"?>
+<TemplafySlideFormConfiguration><![CDATA[{"formFields":[],"formDataEntries":[]}]]></TemplafySlideFormConfiguration>
+</file>
+
+<file path=customXml/item4.xml><?xml version="1.0" encoding="utf-8"?>
+<TemplafySlideFormConfiguration><![CDATA[{"formFields":[],"formDataEntries":[]}]]></TemplafySlideFormConfiguration>
+</file>
+
+<file path=customXml/item5.xml><?xml version="1.0" encoding="utf-8"?>
+<TemplafyTemplateConfiguration><![CDATA[{"elementsMetadata":[{"type":"shape","id":"4677ba61-354d-4365-8b3f-c04251d5c3e5","elementConfiguration":{"binding":"UserProfile.Offices.Workarea_{{DocumentLanguage}}","disableUpdates":false,"type":"text"}},{"type":"shape","id":"b679746d-93d5-4d43-90a4-93ebe9ac3257","elementConfiguration":{"format":"{{DateFormats.GeneralDate}}","binding":"Form.Date","disableUpdates":false,"type":"date"}},{"type":"shape","id":"2b4439ed-ce1f-4eaa-844c-d1e3543b3122","elementConfiguration":{"binding":"Form.PresentationTitle","disableUpdates":false,"type":"text"}}],"transformationConfigurations":[{"language":"{{DocumentLanguage}}","disableUpdates":false,"type":"proofingLanguage"}],"templateName":"DTU Template 16_9 - Navy blue","templateDescription":"","enableDocumentContentUpdater":true,"version":"1.2"}]]></TemplafyTemplateConfiguration>
+</file>
+
+<file path=customXml/item6.xml><?xml version="1.0" encoding="utf-8"?>
 <TemplafySlideTemplateConfiguration><![CDATA[{"documentContentValidatorConfiguration":{"enableDocumentContentValidator":false,"documentContentValidatorVersion":0},"elementsMetadata":[],"slideId":"636957681585124447","enableDocumentContentUpdater":true,"version":"1.2"}]]></TemplafySlideTemplateConfiguration>
 </file>
 
-<file path=customXml/item3.xml><?xml version="1.0" encoding="utf-8"?>
+<file path=customXml/item7.xml><?xml version="1.0" encoding="utf-8"?>
 <TemplafyFormConfiguration><![CDATA[{"formFields":[{"required":false,"helpTexts":{"prefix":"","postfix":""},"spacing":{},"type":"datePicker","name":"Date","label":"Date","fullyQualifiedName":"Date"},{"required":false,"placeholder":"","lines":0,"helpTexts":{"prefix":"","postfix":""},"spacing":{},"type":"textBox","name":"PresentationTitle","label":"Presentation title","fullyQualifiedName":"PresentationTitle"}],"formDataEntries":[{"name":"Date","value":"LEYg78CDTsI++dqBQ7gClg=="}]}]]></TemplafyFormConfiguration>
 </file>
 
-<file path=customXml/item4.xml><?xml version="1.0" encoding="utf-8"?>
-<TemplafyTemplateConfiguration><![CDATA[{"elementsMetadata":[{"type":"shape","id":"4677ba61-354d-4365-8b3f-c04251d5c3e5","elementConfiguration":{"binding":"UserProfile.Offices.Workarea_{{DocumentLanguage}}","disableUpdates":false,"type":"text"}},{"type":"shape","id":"b679746d-93d5-4d43-90a4-93ebe9ac3257","elementConfiguration":{"format":"{{DateFormats.GeneralDate}}","binding":"Form.Date","disableUpdates":false,"type":"date"}},{"type":"shape","id":"2b4439ed-ce1f-4eaa-844c-d1e3543b3122","elementConfiguration":{"binding":"Form.PresentationTitle","disableUpdates":false,"type":"text"}}],"transformationConfigurations":[{"language":"{{DocumentLanguage}}","disableUpdates":false,"type":"proofingLanguage"}],"templateName":"DTU Template 16_9 - Navy blue","templateDescription":"","enableDocumentContentUpdater":true,"version":"1.2"}]]></TemplafyTemplateConfiguration>
-</file>
-
-<file path=customXml/item5.xml><?xml version="1.0" encoding="utf-8"?>
-<TemplafySlideFormConfiguration><![CDATA[{"formFields":[],"formDataEntries":[]}]]></TemplafySlideFormConfiguration>
-</file>
-
-<file path=customXml/item6.xml><?xml version="1.0" encoding="utf-8"?>
-<TemplafySlideFormConfiguration><![CDATA[{"formFields":[],"formDataEntries":[]}]]></TemplafySlideFormConfiguration>
-</file>
-
-<file path=customXml/item7.xml><?xml version="1.0" encoding="utf-8"?>
+<file path=customXml/item8.xml><?xml version="1.0" encoding="utf-8"?>
 <TemplafySlideTemplateConfiguration><![CDATA[{"documentContentValidatorConfiguration":{"enableDocumentContentValidator":false,"documentContentValidatorVersion":0},"elementsMetadata":[],"slideId":"636957681585013765","enableDocumentContentUpdater":true,"version":"1.2"}]]></TemplafySlideTemplateConfiguration>
 </file>
 
-<file path=customXml/item8.xml><?xml version="1.0" encoding="utf-8"?>
-<TemplafySlideTemplateConfiguration><![CDATA[{"documentContentValidatorConfiguration":{"enableDocumentContentValidator":false,"documentContentValidatorVersion":0},"elementsMetadata":[],"slideId":"636957681585124447","enableDocumentContentUpdater":true,"version":"1.2"}]]></TemplafySlideTemplateConfiguration>
+<file path=customXml/itemProps1.xml><?xml version="1.0" encoding="utf-8"?>
+<ds:datastoreItem xmlns:ds="http://schemas.openxmlformats.org/officeDocument/2006/customXml" ds:itemID="{0BC190A8-4F09-4D6F-BBED-980F99C3B238}">
+  <ds:schemaRefs/>
+</ds:datastoreItem>
 </file>
 
-<file path=customXml/itemProps1.xml><?xml version="1.0" encoding="utf-8"?>
+<file path=customXml/itemProps2.xml><?xml version="1.0" encoding="utf-8"?>
 <ds:datastoreItem xmlns:ds="http://schemas.openxmlformats.org/officeDocument/2006/customXml" ds:itemID="{7FEA1E6D-AEEC-41D9-9E9A-45BA2EAE1656}">
   <ds:schemaRefs/>
 </ds:datastoreItem>
 </file>
 
-<file path=customXml/itemProps2.xml><?xml version="1.0" encoding="utf-8"?>
-<ds:datastoreItem xmlns:ds="http://schemas.openxmlformats.org/officeDocument/2006/customXml" ds:itemID="{0BC190A8-4F09-4D6F-BBED-980F99C3B238}">
+<file path=customXml/itemProps3.xml><?xml version="1.0" encoding="utf-8"?>
+<ds:datastoreItem xmlns:ds="http://schemas.openxmlformats.org/officeDocument/2006/customXml" ds:itemID="{BCE4F6AA-590D-471F-8869-D7C9C388B21F}">
   <ds:schemaRefs/>
 </ds:datastoreItem>
 </file>
 
-<file path=customXml/itemProps3.xml><?xml version="1.0" encoding="utf-8"?>
+<file path=customXml/itemProps4.xml><?xml version="1.0" encoding="utf-8"?>
+<ds:datastoreItem xmlns:ds="http://schemas.openxmlformats.org/officeDocument/2006/customXml" ds:itemID="{A99E0396-DE9D-473F-B1CB-768EB622C89A}">
+  <ds:schemaRefs/>
+</ds:datastoreItem>
+</file>
+
+<file path=customXml/itemProps5.xml><?xml version="1.0" encoding="utf-8"?>
+<ds:datastoreItem xmlns:ds="http://schemas.openxmlformats.org/officeDocument/2006/customXml" ds:itemID="{1334258C-C3E7-4029-A615-C886A240FB15}">
+  <ds:schemaRefs/>
+</ds:datastoreItem>
+</file>
+
+<file path=customXml/itemProps6.xml><?xml version="1.0" encoding="utf-8"?>
+<ds:datastoreItem xmlns:ds="http://schemas.openxmlformats.org/officeDocument/2006/customXml" ds:itemID="{AD091A09-3CB8-44F3-AFDB-D8A682CADFEC}">
+  <ds:schemaRefs/>
+</ds:datastoreItem>
+</file>
+
+<file path=customXml/itemProps7.xml><?xml version="1.0" encoding="utf-8"?>
 <ds:datastoreItem xmlns:ds="http://schemas.openxmlformats.org/officeDocument/2006/customXml" ds:itemID="{5B29B696-7354-412C-9B8E-ED20D22F6B23}">
   <ds:schemaRefs/>
 </ds:datastoreItem>
 </file>
 
-<file path=customXml/itemProps4.xml><?xml version="1.0" encoding="utf-8"?>
-<ds:datastoreItem xmlns:ds="http://schemas.openxmlformats.org/officeDocument/2006/customXml" ds:itemID="{1334258C-C3E7-4029-A615-C886A240FB15}">
-  <ds:schemaRefs/>
-</ds:datastoreItem>
-</file>
-
-<file path=customXml/itemProps5.xml><?xml version="1.0" encoding="utf-8"?>
-<ds:datastoreItem xmlns:ds="http://schemas.openxmlformats.org/officeDocument/2006/customXml" ds:itemID="{A99E0396-DE9D-473F-B1CB-768EB622C89A}">
-  <ds:schemaRefs/>
-</ds:datastoreItem>
-</file>
-
-<file path=customXml/itemProps6.xml><?xml version="1.0" encoding="utf-8"?>
-<ds:datastoreItem xmlns:ds="http://schemas.openxmlformats.org/officeDocument/2006/customXml" ds:itemID="{BCE4F6AA-590D-471F-8869-D7C9C388B21F}">
-  <ds:schemaRefs/>
-</ds:datastoreItem>
-</file>
-
-<file path=customXml/itemProps7.xml><?xml version="1.0" encoding="utf-8"?>
+<file path=customXml/itemProps8.xml><?xml version="1.0" encoding="utf-8"?>
 <ds:datastoreItem xmlns:ds="http://schemas.openxmlformats.org/officeDocument/2006/customXml" ds:itemID="{4D5E1A10-B5E6-482A-9521-846112537EBC}">
   <ds:schemaRefs/>
 </ds:datastoreItem>
-</file>
-
-<file path=customXml/itemProps8.xml><?xml version="1.0" encoding="utf-8"?>
-<ds:datastoreItem xmlns:ds="http://schemas.openxmlformats.org/officeDocument/2006/customXml" ds:itemID="{AD091A09-3CB8-44F3-AFDB-D8A682CADFEC}">
-  <ds:schemaRefs/>
-</ds:datastoreItem>
 </file>
</xml_diff>